<commit_message>
Add few links for GraphQL resources
</commit_message>
<xml_diff>
--- a/prezentacja/GraphQL.pptx
+++ b/prezentacja/GraphQL.pptx
@@ -5266,7 +5266,7 @@
         <p:spPr>
           <a:xfrm>
             <a:off x="571472" y="1000108"/>
-            <a:ext cx="6500858" cy="1734840"/>
+            <a:ext cx="7858180" cy="5500726"/>
           </a:xfrm>
           <a:prstGeom prst="rect">
             <a:avLst/>
@@ -5291,29 +5291,6 @@
         <p:txBody>
           <a:bodyPr lIns="90000" tIns="45000" rIns="90000" bIns="45000"/>
           <a:lstStyle/>
-          <a:p>
-            <a:pPr>
-              <a:lnSpc>
-                <a:spcPct val="100000"/>
-              </a:lnSpc>
-            </a:pPr>
-            <a:r>
-              <a:rPr lang="pl-PL" spc="-1" dirty="0" smtClean="0">
-                <a:solidFill>
-                  <a:srgbClr val="000000"/>
-                </a:solidFill>
-                <a:latin typeface="Calibri"/>
-                <a:hlinkClick r:id="rId2"/>
-              </a:rPr>
-              <a:t>https://graphql.org/</a:t>
-            </a:r>
-            <a:endParaRPr lang="pl-PL" spc="-1" dirty="0" smtClean="0">
-              <a:solidFill>
-                <a:srgbClr val="000000"/>
-              </a:solidFill>
-              <a:latin typeface="Calibri"/>
-            </a:endParaRPr>
-          </a:p>
           <a:p>
             <a:pPr>
               <a:lnSpc>
@@ -5325,6 +5302,40 @@
                 <a:srgbClr val="000000"/>
               </a:solidFill>
               <a:latin typeface="Calibri"/>
+              <a:hlinkClick r:id="rId2"/>
+            </a:endParaRPr>
+          </a:p>
+          <a:p>
+            <a:pPr>
+              <a:lnSpc>
+                <a:spcPct val="100000"/>
+              </a:lnSpc>
+            </a:pPr>
+            <a:r>
+              <a:rPr lang="pl-PL" spc="-1" dirty="0" smtClean="0">
+                <a:solidFill>
+                  <a:srgbClr val="000000"/>
+                </a:solidFill>
+                <a:latin typeface="Calibri"/>
+                <a:hlinkClick r:id="rId2"/>
+              </a:rPr>
+              <a:t>https</a:t>
+            </a:r>
+            <a:r>
+              <a:rPr lang="pl-PL" spc="-1" dirty="0" smtClean="0">
+                <a:solidFill>
+                  <a:srgbClr val="000000"/>
+                </a:solidFill>
+                <a:latin typeface="Calibri"/>
+                <a:hlinkClick r:id="rId2"/>
+              </a:rPr>
+              <a:t>://graphql.org/</a:t>
+            </a:r>
+            <a:endParaRPr lang="pl-PL" spc="-1" dirty="0" smtClean="0">
+              <a:solidFill>
+                <a:srgbClr val="000000"/>
+              </a:solidFill>
+              <a:latin typeface="Calibri"/>
             </a:endParaRPr>
           </a:p>
           <a:p>
@@ -5362,7 +5373,16 @@
                 </a:solidFill>
                 <a:latin typeface="Calibri"/>
               </a:rPr>
-              <a:t> public </a:t>
+              <a:t> </a:t>
+            </a:r>
+            <a:r>
+              <a:rPr lang="pl-PL" spc="-1" dirty="0" smtClean="0">
+                <a:solidFill>
+                  <a:srgbClr val="000000"/>
+                </a:solidFill>
+                <a:latin typeface="Calibri"/>
+              </a:rPr>
+              <a:t>public </a:t>
             </a:r>
             <a:r>
               <a:rPr lang="pl-PL" spc="-1" dirty="0" err="1" smtClean="0">
@@ -5451,17 +5471,308 @@
               </a:rPr>
               <a:t>api.graphcms.com/simple/v1/swapi</a:t>
             </a:r>
-            <a:r>
-              <a:rPr lang="pl-PL" spc="-1" dirty="0" smtClean="0">
+            <a:endParaRPr lang="pl-PL" spc="-1" dirty="0" smtClean="0">
+              <a:solidFill>
+                <a:srgbClr val="000000"/>
+              </a:solidFill>
+              <a:latin typeface="Calibri"/>
+            </a:endParaRPr>
+          </a:p>
+          <a:p>
+            <a:pPr>
+              <a:lnSpc>
+                <a:spcPct val="100000"/>
+              </a:lnSpc>
+            </a:pPr>
+            <a:endParaRPr lang="pl-PL" spc="-1" dirty="0" smtClean="0">
+              <a:solidFill>
+                <a:srgbClr val="000000"/>
+              </a:solidFill>
+              <a:latin typeface="Calibri"/>
+            </a:endParaRPr>
+          </a:p>
+          <a:p>
+            <a:pPr>
+              <a:lnSpc>
+                <a:spcPct val="100000"/>
+              </a:lnSpc>
+            </a:pPr>
+            <a:endParaRPr lang="pl-PL" spc="-1" dirty="0" smtClean="0">
+              <a:solidFill>
+                <a:srgbClr val="000000"/>
+              </a:solidFill>
+              <a:latin typeface="Calibri"/>
+            </a:endParaRPr>
+          </a:p>
+          <a:p>
+            <a:pPr>
+              <a:lnSpc>
+                <a:spcPct val="100000"/>
+              </a:lnSpc>
+            </a:pPr>
+            <a:endParaRPr lang="pl-PL" spc="-1" dirty="0" smtClean="0">
+              <a:solidFill>
+                <a:srgbClr val="000000"/>
+              </a:solidFill>
+              <a:latin typeface="Calibri"/>
+            </a:endParaRPr>
+          </a:p>
+          <a:p>
+            <a:pPr>
+              <a:lnSpc>
+                <a:spcPct val="100000"/>
+              </a:lnSpc>
+            </a:pPr>
+            <a:r>
+              <a:rPr lang="pl-PL" spc="-1" dirty="0" err="1" smtClean="0">
                 <a:solidFill>
                   <a:srgbClr val="000000"/>
                 </a:solidFill>
                 <a:latin typeface="Calibri"/>
               </a:rPr>
-              <a:t> </a:t>
-            </a:r>
+              <a:t>YouTube</a:t>
+            </a:r>
+            <a:endParaRPr lang="pl-PL" spc="-1" dirty="0" smtClean="0">
+              <a:solidFill>
+                <a:srgbClr val="000000"/>
+              </a:solidFill>
+              <a:latin typeface="Calibri"/>
+            </a:endParaRPr>
+          </a:p>
+          <a:p>
+            <a:pPr>
+              <a:lnSpc>
+                <a:spcPct val="100000"/>
+              </a:lnSpc>
+            </a:pPr>
+            <a:r>
+              <a:rPr lang="en-US" dirty="0" smtClean="0">
+                <a:latin typeface="Calibri" pitchFamily="34" charset="0"/>
+                <a:hlinkClick r:id="rId5" tooltip="https://www.youtube.com/watch?v=iHxu2bq3fxI"/>
+              </a:rPr>
+              <a:t>Moving beyond REST: </a:t>
+            </a:r>
+            <a:r>
+              <a:rPr lang="en-US" dirty="0" err="1" smtClean="0">
+                <a:latin typeface="Calibri" pitchFamily="34" charset="0"/>
+                <a:hlinkClick r:id="rId5" tooltip="https://www.youtube.com/watch?v=iHxu2bq3fxI"/>
+              </a:rPr>
+              <a:t>GraphQL</a:t>
+            </a:r>
+            <a:r>
+              <a:rPr lang="en-US" dirty="0" smtClean="0">
+                <a:latin typeface="Calibri" pitchFamily="34" charset="0"/>
+                <a:hlinkClick r:id="rId5" tooltip="https://www.youtube.com/watch?v=iHxu2bq3fxI"/>
+              </a:rPr>
+              <a:t> and Java &amp; Spring by </a:t>
+            </a:r>
+            <a:r>
+              <a:rPr lang="en-US" dirty="0" err="1" smtClean="0">
+                <a:latin typeface="Calibri" pitchFamily="34" charset="0"/>
+                <a:hlinkClick r:id="rId5" tooltip="https://www.youtube.com/watch?v=iHxu2bq3fxI"/>
+              </a:rPr>
+              <a:t>Pratik</a:t>
+            </a:r>
+            <a:r>
+              <a:rPr lang="en-US" dirty="0" smtClean="0">
+                <a:latin typeface="Calibri" pitchFamily="34" charset="0"/>
+                <a:hlinkClick r:id="rId5" tooltip="https://www.youtube.com/watch?v=iHxu2bq3fxI"/>
+              </a:rPr>
+              <a:t> Patel @ Spring I/O 2019</a:t>
+            </a:r>
+            <a:endParaRPr lang="pl-PL" dirty="0" smtClean="0">
+              <a:latin typeface="Calibri" pitchFamily="34" charset="0"/>
+            </a:endParaRPr>
+          </a:p>
+          <a:p>
+            <a:pPr>
+              <a:lnSpc>
+                <a:spcPct val="100000"/>
+              </a:lnSpc>
+            </a:pPr>
+            <a:r>
+              <a:rPr lang="en-US" dirty="0" err="1" smtClean="0">
+                <a:latin typeface="Calibri" pitchFamily="34" charset="0"/>
+                <a:hlinkClick r:id="rId6" tooltip="https://www.youtube.com/watch?v=5_uSpiXCeMI&amp;pbjreload=10"/>
+              </a:rPr>
+              <a:t>GraphQL</a:t>
+            </a:r>
+            <a:r>
+              <a:rPr lang="en-US" dirty="0" smtClean="0">
+                <a:latin typeface="Calibri" pitchFamily="34" charset="0"/>
+                <a:hlinkClick r:id="rId6" tooltip="https://www.youtube.com/watch?v=5_uSpiXCeMI&amp;pbjreload=10"/>
+              </a:rPr>
+              <a:t> in Java World, let's go for a dive - Vladimir </a:t>
+            </a:r>
+            <a:r>
+              <a:rPr lang="en-US" dirty="0" err="1" smtClean="0">
+                <a:latin typeface="Calibri" pitchFamily="34" charset="0"/>
+                <a:hlinkClick r:id="rId6" tooltip="https://www.youtube.com/watch?v=5_uSpiXCeMI&amp;pbjreload=10"/>
+              </a:rPr>
+              <a:t>Dejanović</a:t>
+            </a:r>
+            <a:r>
+              <a:rPr lang="en-US" dirty="0" smtClean="0">
+                <a:latin typeface="Calibri" pitchFamily="34" charset="0"/>
+                <a:hlinkClick r:id="rId6" tooltip="https://www.youtube.com/watch?v=5_uSpiXCeMI&amp;pbjreload=10"/>
+              </a:rPr>
+              <a:t> @</a:t>
+            </a:r>
+            <a:r>
+              <a:rPr lang="en-US" dirty="0" err="1" smtClean="0">
+                <a:latin typeface="Calibri" pitchFamily="34" charset="0"/>
+                <a:hlinkClick r:id="rId6" tooltip="https://www.youtube.com/watch?v=5_uSpiXCeMI&amp;pbjreload=10"/>
+              </a:rPr>
+              <a:t>Devoxx</a:t>
+            </a:r>
+            <a:r>
+              <a:rPr lang="en-US" dirty="0" smtClean="0">
+                <a:latin typeface="Calibri" pitchFamily="34" charset="0"/>
+                <a:hlinkClick r:id="rId6" tooltip="https://www.youtube.com/watch?v=5_uSpiXCeMI&amp;pbjreload=10"/>
+              </a:rPr>
+              <a:t> 2019</a:t>
+            </a:r>
+            <a:endParaRPr lang="pl-PL" dirty="0" smtClean="0">
+              <a:latin typeface="Calibri" pitchFamily="34" charset="0"/>
+            </a:endParaRPr>
+          </a:p>
+          <a:p>
+            <a:pPr>
+              <a:lnSpc>
+                <a:spcPct val="100000"/>
+              </a:lnSpc>
+            </a:pPr>
+            <a:endParaRPr lang="pl-PL" sz="1800" b="0" strike="noStrike" spc="-1" dirty="0" smtClean="0">
+              <a:latin typeface="Calibri" pitchFamily="34" charset="0"/>
+            </a:endParaRPr>
+          </a:p>
+          <a:p>
+            <a:pPr>
+              <a:lnSpc>
+                <a:spcPct val="100000"/>
+              </a:lnSpc>
+            </a:pPr>
+            <a:r>
+              <a:rPr lang="pl-PL" spc="-1" dirty="0" err="1" smtClean="0">
+                <a:latin typeface="Calibri" pitchFamily="34" charset="0"/>
+              </a:rPr>
+              <a:t>GitHub</a:t>
+            </a:r>
+            <a:endParaRPr lang="pl-PL" spc="-1" dirty="0" smtClean="0">
+              <a:latin typeface="Calibri" pitchFamily="34" charset="0"/>
+            </a:endParaRPr>
+          </a:p>
+          <a:p>
+            <a:pPr>
+              <a:lnSpc>
+                <a:spcPct val="100000"/>
+              </a:lnSpc>
+            </a:pPr>
+            <a:r>
+              <a:rPr lang="en-US" spc="-1" dirty="0" err="1" smtClean="0">
+                <a:latin typeface="Calibri" pitchFamily="34" charset="0"/>
+                <a:hlinkClick r:id="rId7"/>
+              </a:rPr>
+              <a:t>GraphQL</a:t>
+            </a:r>
+            <a:r>
+              <a:rPr lang="en-US" spc="-1" dirty="0" smtClean="0">
+                <a:latin typeface="Calibri" pitchFamily="34" charset="0"/>
+                <a:hlinkClick r:id="rId7"/>
+              </a:rPr>
+              <a:t> projects</a:t>
+            </a:r>
+            <a:endParaRPr lang="pl-PL" spc="-1" dirty="0" smtClean="0">
+              <a:latin typeface="Calibri" pitchFamily="34" charset="0"/>
+            </a:endParaRPr>
+          </a:p>
+          <a:p>
+            <a:pPr>
+              <a:lnSpc>
+                <a:spcPct val="100000"/>
+              </a:lnSpc>
+            </a:pPr>
+            <a:r>
+              <a:rPr lang="en-US" spc="-1" dirty="0" err="1" smtClean="0">
+                <a:latin typeface="Calibri" pitchFamily="34" charset="0"/>
+                <a:hlinkClick r:id="rId8"/>
+              </a:rPr>
+              <a:t>GraphQL</a:t>
+            </a:r>
+            <a:r>
+              <a:rPr lang="en-US" spc="-1" dirty="0" smtClean="0">
+                <a:latin typeface="Calibri" pitchFamily="34" charset="0"/>
+                <a:hlinkClick r:id="rId8"/>
+              </a:rPr>
+              <a:t> pet clinic</a:t>
+            </a:r>
+            <a:endParaRPr lang="pl-PL" spc="-1" dirty="0" smtClean="0">
+              <a:latin typeface="Calibri" pitchFamily="34" charset="0"/>
+            </a:endParaRPr>
+          </a:p>
+          <a:p>
+            <a:pPr>
+              <a:lnSpc>
+                <a:spcPct val="100000"/>
+              </a:lnSpc>
+            </a:pPr>
+            <a:endParaRPr lang="pl-PL" sz="1800" b="0" strike="noStrike" spc="-1" dirty="0" smtClean="0">
+              <a:latin typeface="Calibri" pitchFamily="34" charset="0"/>
+            </a:endParaRPr>
+          </a:p>
+          <a:p>
+            <a:pPr>
+              <a:lnSpc>
+                <a:spcPct val="100000"/>
+              </a:lnSpc>
+            </a:pPr>
+            <a:r>
+              <a:rPr lang="en-US" spc="-1" dirty="0" smtClean="0">
+                <a:latin typeface="Calibri" pitchFamily="34" charset="0"/>
+                <a:hlinkClick r:id="rId9"/>
+              </a:rPr>
+              <a:t>SPQR - </a:t>
+            </a:r>
+            <a:r>
+              <a:rPr lang="en-US" spc="-1" dirty="0" err="1" smtClean="0">
+                <a:latin typeface="Calibri" pitchFamily="34" charset="0"/>
+                <a:hlinkClick r:id="rId9"/>
+              </a:rPr>
+              <a:t>GraphQL</a:t>
+            </a:r>
+            <a:r>
+              <a:rPr lang="en-US" spc="-1" dirty="0" smtClean="0">
+                <a:latin typeface="Calibri" pitchFamily="34" charset="0"/>
+                <a:hlinkClick r:id="rId9"/>
+              </a:rPr>
+              <a:t> library for rapid development of </a:t>
+            </a:r>
+            <a:r>
+              <a:rPr lang="en-US" spc="-1" dirty="0" err="1" smtClean="0">
+                <a:latin typeface="Calibri" pitchFamily="34" charset="0"/>
+                <a:hlinkClick r:id="rId9"/>
+              </a:rPr>
+              <a:t>GraphQL</a:t>
+            </a:r>
+            <a:r>
+              <a:rPr lang="en-US" spc="-1" dirty="0" smtClean="0">
+                <a:latin typeface="Calibri" pitchFamily="34" charset="0"/>
+                <a:hlinkClick r:id="rId9"/>
+              </a:rPr>
+              <a:t> APIs in Java.</a:t>
+            </a:r>
+            <a:endParaRPr lang="pl-PL" spc="-1" dirty="0" smtClean="0">
+              <a:latin typeface="Calibri" pitchFamily="34" charset="0"/>
+            </a:endParaRPr>
+          </a:p>
+          <a:p>
+            <a:pPr>
+              <a:lnSpc>
+                <a:spcPct val="100000"/>
+              </a:lnSpc>
+            </a:pPr>
             <a:endParaRPr lang="en-US" sz="1800" b="0" strike="noStrike" spc="-1" dirty="0">
-              <a:latin typeface="Arial"/>
+              <a:latin typeface="Calibri" pitchFamily="34" charset="0"/>
             </a:endParaRPr>
           </a:p>
         </p:txBody>
@@ -6625,11 +6936,7 @@
             </a:r>
             <a:r>
               <a:rPr lang="pl-PL" dirty="0" err="1" smtClean="0"/>
-              <a:t>G</a:t>
-            </a:r>
-            <a:r>
-              <a:rPr lang="pl-PL" dirty="0" err="1" smtClean="0"/>
-              <a:t>raphQL</a:t>
+              <a:t>GraphQL</a:t>
             </a:r>
             <a:r>
               <a:rPr lang="pl-PL" dirty="0" smtClean="0"/>

</xml_diff>